<commit_message>
add "new coming" page
new function needed I think
类似微信说话的祝福语音
push message
</commit_message>
<xml_diff>
--- a/documentation/PostMarry.pptx
+++ b/documentation/PostMarry.pptx
@@ -10,6 +10,7 @@
     <p:sldId id="258" r:id="rId4"/>
     <p:sldId id="260" r:id="rId5"/>
     <p:sldId id="259" r:id="rId6"/>
+    <p:sldId id="261" r:id="rId7"/>
   </p:sldIdLst>
   <p:sldSz cx="9144000" cy="6858000" type="screen4x3"/>
   <p:notesSz cx="6858000" cy="9144000"/>
@@ -292,7 +293,8 @@
           <a:p>
             <a:fld id="{533BAE7C-60D4-429C-AD43-C5C3C0F29ECC}" type="datetimeFigureOut">
               <a:rPr lang="zh-CN" altLang="en-US" smtClean="0"/>
-              <a:t>2013/4/6</a:t>
+              <a:pPr/>
+              <a:t>2013/4/7</a:t>
             </a:fld>
             <a:endParaRPr lang="zh-CN" altLang="en-US"/>
           </a:p>
@@ -334,6 +336,7 @@
           <a:p>
             <a:fld id="{955635A3-1952-4E28-88A6-7E43DBFE6233}" type="slidenum">
               <a:rPr lang="zh-CN" altLang="en-US" smtClean="0"/>
+              <a:pPr/>
               <a:t>‹#›</a:t>
             </a:fld>
             <a:endParaRPr lang="zh-CN" altLang="en-US"/>
@@ -457,7 +460,8 @@
           <a:p>
             <a:fld id="{533BAE7C-60D4-429C-AD43-C5C3C0F29ECC}" type="datetimeFigureOut">
               <a:rPr lang="zh-CN" altLang="en-US" smtClean="0"/>
-              <a:t>2013/4/6</a:t>
+              <a:pPr/>
+              <a:t>2013/4/7</a:t>
             </a:fld>
             <a:endParaRPr lang="zh-CN" altLang="en-US"/>
           </a:p>
@@ -499,6 +503,7 @@
           <a:p>
             <a:fld id="{955635A3-1952-4E28-88A6-7E43DBFE6233}" type="slidenum">
               <a:rPr lang="zh-CN" altLang="en-US" smtClean="0"/>
+              <a:pPr/>
               <a:t>‹#›</a:t>
             </a:fld>
             <a:endParaRPr lang="zh-CN" altLang="en-US"/>
@@ -632,7 +637,8 @@
           <a:p>
             <a:fld id="{533BAE7C-60D4-429C-AD43-C5C3C0F29ECC}" type="datetimeFigureOut">
               <a:rPr lang="zh-CN" altLang="en-US" smtClean="0"/>
-              <a:t>2013/4/6</a:t>
+              <a:pPr/>
+              <a:t>2013/4/7</a:t>
             </a:fld>
             <a:endParaRPr lang="zh-CN" altLang="en-US"/>
           </a:p>
@@ -674,6 +680,7 @@
           <a:p>
             <a:fld id="{955635A3-1952-4E28-88A6-7E43DBFE6233}" type="slidenum">
               <a:rPr lang="zh-CN" altLang="en-US" smtClean="0"/>
+              <a:pPr/>
               <a:t>‹#›</a:t>
             </a:fld>
             <a:endParaRPr lang="zh-CN" altLang="en-US"/>
@@ -797,7 +804,8 @@
           <a:p>
             <a:fld id="{533BAE7C-60D4-429C-AD43-C5C3C0F29ECC}" type="datetimeFigureOut">
               <a:rPr lang="zh-CN" altLang="en-US" smtClean="0"/>
-              <a:t>2013/4/6</a:t>
+              <a:pPr/>
+              <a:t>2013/4/7</a:t>
             </a:fld>
             <a:endParaRPr lang="zh-CN" altLang="en-US"/>
           </a:p>
@@ -839,6 +847,7 @@
           <a:p>
             <a:fld id="{955635A3-1952-4E28-88A6-7E43DBFE6233}" type="slidenum">
               <a:rPr lang="zh-CN" altLang="en-US" smtClean="0"/>
+              <a:pPr/>
               <a:t>‹#›</a:t>
             </a:fld>
             <a:endParaRPr lang="zh-CN" altLang="en-US"/>
@@ -1038,7 +1047,8 @@
           <a:p>
             <a:fld id="{533BAE7C-60D4-429C-AD43-C5C3C0F29ECC}" type="datetimeFigureOut">
               <a:rPr lang="zh-CN" altLang="en-US" smtClean="0"/>
-              <a:t>2013/4/6</a:t>
+              <a:pPr/>
+              <a:t>2013/4/7</a:t>
             </a:fld>
             <a:endParaRPr lang="zh-CN" altLang="en-US"/>
           </a:p>
@@ -1080,6 +1090,7 @@
           <a:p>
             <a:fld id="{955635A3-1952-4E28-88A6-7E43DBFE6233}" type="slidenum">
               <a:rPr lang="zh-CN" altLang="en-US" smtClean="0"/>
+              <a:pPr/>
               <a:t>‹#›</a:t>
             </a:fld>
             <a:endParaRPr lang="zh-CN" altLang="en-US"/>
@@ -1321,7 +1332,8 @@
           <a:p>
             <a:fld id="{533BAE7C-60D4-429C-AD43-C5C3C0F29ECC}" type="datetimeFigureOut">
               <a:rPr lang="zh-CN" altLang="en-US" smtClean="0"/>
-              <a:t>2013/4/6</a:t>
+              <a:pPr/>
+              <a:t>2013/4/7</a:t>
             </a:fld>
             <a:endParaRPr lang="zh-CN" altLang="en-US"/>
           </a:p>
@@ -1363,6 +1375,7 @@
           <a:p>
             <a:fld id="{955635A3-1952-4E28-88A6-7E43DBFE6233}" type="slidenum">
               <a:rPr lang="zh-CN" altLang="en-US" smtClean="0"/>
+              <a:pPr/>
               <a:t>‹#›</a:t>
             </a:fld>
             <a:endParaRPr lang="zh-CN" altLang="en-US"/>
@@ -1738,7 +1751,8 @@
           <a:p>
             <a:fld id="{533BAE7C-60D4-429C-AD43-C5C3C0F29ECC}" type="datetimeFigureOut">
               <a:rPr lang="zh-CN" altLang="en-US" smtClean="0"/>
-              <a:t>2013/4/6</a:t>
+              <a:pPr/>
+              <a:t>2013/4/7</a:t>
             </a:fld>
             <a:endParaRPr lang="zh-CN" altLang="en-US"/>
           </a:p>
@@ -1780,6 +1794,7 @@
           <a:p>
             <a:fld id="{955635A3-1952-4E28-88A6-7E43DBFE6233}" type="slidenum">
               <a:rPr lang="zh-CN" altLang="en-US" smtClean="0"/>
+              <a:pPr/>
               <a:t>‹#›</a:t>
             </a:fld>
             <a:endParaRPr lang="zh-CN" altLang="en-US"/>
@@ -1851,7 +1866,8 @@
           <a:p>
             <a:fld id="{533BAE7C-60D4-429C-AD43-C5C3C0F29ECC}" type="datetimeFigureOut">
               <a:rPr lang="zh-CN" altLang="en-US" smtClean="0"/>
-              <a:t>2013/4/6</a:t>
+              <a:pPr/>
+              <a:t>2013/4/7</a:t>
             </a:fld>
             <a:endParaRPr lang="zh-CN" altLang="en-US"/>
           </a:p>
@@ -1893,6 +1909,7 @@
           <a:p>
             <a:fld id="{955635A3-1952-4E28-88A6-7E43DBFE6233}" type="slidenum">
               <a:rPr lang="zh-CN" altLang="en-US" smtClean="0"/>
+              <a:pPr/>
               <a:t>‹#›</a:t>
             </a:fld>
             <a:endParaRPr lang="zh-CN" altLang="en-US"/>
@@ -1941,7 +1958,8 @@
           <a:p>
             <a:fld id="{533BAE7C-60D4-429C-AD43-C5C3C0F29ECC}" type="datetimeFigureOut">
               <a:rPr lang="zh-CN" altLang="en-US" smtClean="0"/>
-              <a:t>2013/4/6</a:t>
+              <a:pPr/>
+              <a:t>2013/4/7</a:t>
             </a:fld>
             <a:endParaRPr lang="zh-CN" altLang="en-US"/>
           </a:p>
@@ -1983,6 +2001,7 @@
           <a:p>
             <a:fld id="{955635A3-1952-4E28-88A6-7E43DBFE6233}" type="slidenum">
               <a:rPr lang="zh-CN" altLang="en-US" smtClean="0"/>
+              <a:pPr/>
               <a:t>‹#›</a:t>
             </a:fld>
             <a:endParaRPr lang="zh-CN" altLang="en-US"/>
@@ -2213,7 +2232,8 @@
           <a:p>
             <a:fld id="{533BAE7C-60D4-429C-AD43-C5C3C0F29ECC}" type="datetimeFigureOut">
               <a:rPr lang="zh-CN" altLang="en-US" smtClean="0"/>
-              <a:t>2013/4/6</a:t>
+              <a:pPr/>
+              <a:t>2013/4/7</a:t>
             </a:fld>
             <a:endParaRPr lang="zh-CN" altLang="en-US"/>
           </a:p>
@@ -2255,6 +2275,7 @@
           <a:p>
             <a:fld id="{955635A3-1952-4E28-88A6-7E43DBFE6233}" type="slidenum">
               <a:rPr lang="zh-CN" altLang="en-US" smtClean="0"/>
+              <a:pPr/>
               <a:t>‹#›</a:t>
             </a:fld>
             <a:endParaRPr lang="zh-CN" altLang="en-US"/>
@@ -2461,7 +2482,8 @@
           <a:p>
             <a:fld id="{533BAE7C-60D4-429C-AD43-C5C3C0F29ECC}" type="datetimeFigureOut">
               <a:rPr lang="zh-CN" altLang="en-US" smtClean="0"/>
-              <a:t>2013/4/6</a:t>
+              <a:pPr/>
+              <a:t>2013/4/7</a:t>
             </a:fld>
             <a:endParaRPr lang="zh-CN" altLang="en-US"/>
           </a:p>
@@ -2503,6 +2525,7 @@
           <a:p>
             <a:fld id="{955635A3-1952-4E28-88A6-7E43DBFE6233}" type="slidenum">
               <a:rPr lang="zh-CN" altLang="en-US" smtClean="0"/>
+              <a:pPr/>
               <a:t>‹#›</a:t>
             </a:fld>
             <a:endParaRPr lang="zh-CN" altLang="en-US"/>
@@ -2669,7 +2692,8 @@
           <a:p>
             <a:fld id="{533BAE7C-60D4-429C-AD43-C5C3C0F29ECC}" type="datetimeFigureOut">
               <a:rPr lang="zh-CN" altLang="en-US" smtClean="0"/>
-              <a:t>2013/4/6</a:t>
+              <a:pPr/>
+              <a:t>2013/4/7</a:t>
             </a:fld>
             <a:endParaRPr lang="zh-CN" altLang="en-US"/>
           </a:p>
@@ -2747,6 +2771,7 @@
           <a:p>
             <a:fld id="{955635A3-1952-4E28-88A6-7E43DBFE6233}" type="slidenum">
               <a:rPr lang="zh-CN" altLang="en-US" smtClean="0"/>
+              <a:pPr/>
               <a:t>‹#›</a:t>
             </a:fld>
             <a:endParaRPr lang="zh-CN" altLang="en-US"/>
@@ -3777,6 +3802,83 @@
             <a:r>
               <a:rPr lang="en-US" altLang="zh-CN" dirty="0" smtClean="0"/>
               <a:t>, TRUE SHOP</a:t>
+            </a:r>
+            <a:endParaRPr lang="zh-CN" altLang="en-US" dirty="0"/>
+          </a:p>
+        </p:txBody>
+      </p:sp>
+    </p:spTree>
+  </p:cSld>
+  <p:clrMapOvr>
+    <a:masterClrMapping/>
+  </p:clrMapOvr>
+</p:sld>
+</file>
+
+<file path=ppt/slides/slide6.xml><?xml version="1.0" encoding="utf-8"?>
+<p:sld xmlns:a="http://schemas.openxmlformats.org/drawingml/2006/main" xmlns:r="http://schemas.openxmlformats.org/officeDocument/2006/relationships" xmlns:p="http://schemas.openxmlformats.org/presentationml/2006/main">
+  <p:cSld>
+    <p:spTree>
+      <p:nvGrpSpPr>
+        <p:cNvPr id="1" name=""/>
+        <p:cNvGrpSpPr/>
+        <p:nvPr/>
+      </p:nvGrpSpPr>
+      <p:grpSpPr>
+        <a:xfrm>
+          <a:off x="0" y="0"/>
+          <a:ext cx="0" cy="0"/>
+          <a:chOff x="0" y="0"/>
+          <a:chExt cx="0" cy="0"/>
+        </a:xfrm>
+      </p:grpSpPr>
+      <p:sp>
+        <p:nvSpPr>
+          <p:cNvPr id="2" name="标题 1"/>
+          <p:cNvSpPr>
+            <a:spLocks noGrp="1"/>
+          </p:cNvSpPr>
+          <p:nvPr>
+            <p:ph type="title"/>
+          </p:nvPr>
+        </p:nvSpPr>
+        <p:spPr/>
+        <p:txBody>
+          <a:bodyPr/>
+          <a:lstStyle/>
+          <a:p>
+            <a:r>
+              <a:rPr lang="en-US" altLang="zh-CN" dirty="0" smtClean="0"/>
+              <a:t>New Coming</a:t>
+            </a:r>
+            <a:endParaRPr lang="zh-CN" altLang="en-US" dirty="0"/>
+          </a:p>
+        </p:txBody>
+      </p:sp>
+      <p:sp>
+        <p:nvSpPr>
+          <p:cNvPr id="3" name="内容占位符 2"/>
+          <p:cNvSpPr>
+            <a:spLocks noGrp="1"/>
+          </p:cNvSpPr>
+          <p:nvPr>
+            <p:ph idx="1"/>
+          </p:nvPr>
+        </p:nvSpPr>
+        <p:spPr/>
+        <p:txBody>
+          <a:bodyPr/>
+          <a:lstStyle/>
+          <a:p>
+            <a:r>
+              <a:rPr lang="zh-CN" altLang="en-US" dirty="0" smtClean="0"/>
+              <a:t>类似微信说话的祝福语音</a:t>
+            </a:r>
+          </a:p>
+          <a:p>
+            <a:r>
+              <a:rPr lang="en-US" altLang="zh-CN" dirty="0" smtClean="0"/>
+              <a:t>Push message</a:t>
             </a:r>
             <a:endParaRPr lang="zh-CN" altLang="en-US" dirty="0"/>
           </a:p>

</xml_diff>